<commit_message>
add materi pertemuan kedua
</commit_message>
<xml_diff>
--- a/Pertemuan I/1. Framework Aplikasi Web  Profil Matakuliah dan Aturan.pptx
+++ b/Pertemuan I/1. Framework Aplikasi Web  Profil Matakuliah dan Aturan.pptx
@@ -115,13 +115,38 @@
       </a:defRPr>
     </a:lvl9pPr>
   </p:defaultTextStyle>
+  <p:extLst>
+    <p:ext uri="{EFAFB233-063F-42B5-8137-9DF3F51BA10A}">
+      <p15:sldGuideLst xmlns:p15="http://schemas.microsoft.com/office/powerpoint/2012/main">
+        <p15:guide id="1" orient="horz" pos="2160">
+          <p15:clr>
+            <a:srgbClr val="A4A3A4"/>
+          </p15:clr>
+        </p15:guide>
+        <p15:guide id="2" pos="3840">
+          <p15:clr>
+            <a:srgbClr val="A4A3A4"/>
+          </p15:clr>
+        </p15:guide>
+      </p15:sldGuideLst>
+    </p:ext>
+  </p:extLst>
 </p:presentation>
 </file>
 
 <file path=ppt/charts/chart1.xml><?xml version="1.0" encoding="utf-8"?>
-<c:chartSpace xmlns:c="http://schemas.openxmlformats.org/drawingml/2006/chart" xmlns:a="http://schemas.openxmlformats.org/drawingml/2006/main" xmlns:r="http://schemas.openxmlformats.org/officeDocument/2006/relationships">
-  <c:date1904 val="1"/>
-  <c:lang val="id-ID"/>
+<c:chartSpace xmlns:c="http://schemas.openxmlformats.org/drawingml/2006/chart" xmlns:a="http://schemas.openxmlformats.org/drawingml/2006/main" xmlns:r="http://schemas.openxmlformats.org/officeDocument/2006/relationships" xmlns:c16r2="http://schemas.microsoft.com/office/drawing/2015/06/chart">
+  <c:date1904 val="0"/>
+  <c:lang val="en-US"/>
+  <c:roundedCorners val="0"/>
+  <mc:AlternateContent xmlns:mc="http://schemas.openxmlformats.org/markup-compatibility/2006">
+    <mc:Choice xmlns:c14="http://schemas.microsoft.com/office/drawing/2007/8/2/chart" Requires="c14">
+      <c14:style val="102"/>
+    </mc:Choice>
+    <mc:Fallback>
+      <c:style val="2"/>
+    </mc:Fallback>
+  </mc:AlternateContent>
   <c:chart>
     <c:autoTitleDeleted val="1"/>
     <c:plotArea>
@@ -129,6 +154,7 @@
       <c:barChart>
         <c:barDir val="col"/>
         <c:grouping val="clustered"/>
+        <c:varyColors val="0"/>
         <c:ser>
           <c:idx val="0"/>
           <c:order val="0"/>
@@ -158,6 +184,7 @@
               </a:outerShdw>
             </a:effectLst>
           </c:spPr>
+          <c:invertIfNegative val="0"/>
           <c:dLbls>
             <c:spPr>
               <a:pattFill prst="pct75">
@@ -201,14 +228,18 @@
                     <a:cs typeface="+mn-cs"/>
                   </a:defRPr>
                 </a:pPr>
-                <a:endParaRPr lang="id-ID"/>
+                <a:endParaRPr lang="en-US"/>
               </a:p>
             </c:txPr>
+            <c:showLegendKey val="0"/>
             <c:showVal val="1"/>
             <c:showCatName val="1"/>
-            <c:extLst xmlns:c16r2="http://schemas.microsoft.com/office/drawing/2015/06/chart">
+            <c:showSerName val="0"/>
+            <c:showPercent val="0"/>
+            <c:showBubbleSize val="0"/>
+            <c:showLeaderLines val="0"/>
+            <c:extLst>
               <c:ext xmlns:c15="http://schemas.microsoft.com/office/drawing/2012/chart" uri="{CE6537A1-D6FC-4f65-9D91-7224C49458BB}">
-                <c15:layout/>
                 <c15:showLeaderLines val="1"/>
                 <c15:leaderLines>
                   <c:spPr>
@@ -279,12 +310,20 @@
               </c:numCache>
             </c:numRef>
           </c:val>
-          <c:extLst xmlns:c16r2="http://schemas.microsoft.com/office/drawing/2015/06/chart">
+          <c:extLst>
             <c:ext xmlns:c16="http://schemas.microsoft.com/office/drawing/2014/chart" uri="{C3380CC4-5D6E-409C-BE32-E72D297353CC}">
               <c16:uniqueId val="{00000000-78CF-4BBB-8BA2-A05E4341AB92}"/>
             </c:ext>
           </c:extLst>
         </c:ser>
+        <c:dLbls>
+          <c:showLegendKey val="0"/>
+          <c:showVal val="0"/>
+          <c:showCatName val="0"/>
+          <c:showSerName val="0"/>
+          <c:showPercent val="0"/>
+          <c:showBubbleSize val="0"/>
+        </c:dLbls>
         <c:gapWidth val="41"/>
         <c:axId val="76580736"/>
         <c:axId val="76582272"/>
@@ -294,8 +333,11 @@
         <c:scaling>
           <c:orientation val="minMax"/>
         </c:scaling>
+        <c:delete val="0"/>
         <c:axPos val="b"/>
         <c:numFmt formatCode="General" sourceLinked="1"/>
+        <c:majorTickMark val="out"/>
+        <c:minorTickMark val="none"/>
         <c:tickLblPos val="nextTo"/>
         <c:spPr>
           <a:noFill/>
@@ -327,7 +369,7 @@
                 <a:cs typeface="+mn-cs"/>
               </a:defRPr>
             </a:pPr>
-            <a:endParaRPr lang="id-ID"/>
+            <a:endParaRPr lang="en-US"/>
           </a:p>
         </c:txPr>
         <c:crossAx val="76582272"/>
@@ -335,12 +377,14 @@
         <c:auto val="1"/>
         <c:lblAlgn val="ctr"/>
         <c:lblOffset val="100"/>
+        <c:noMultiLvlLbl val="0"/>
       </c:catAx>
       <c:valAx>
         <c:axId val="76582272"/>
         <c:scaling>
           <c:orientation val="minMax"/>
         </c:scaling>
+        <c:delete val="0"/>
         <c:axPos val="l"/>
         <c:majorGridlines>
           <c:spPr>
@@ -369,6 +413,8 @@
           </c:spPr>
         </c:majorGridlines>
         <c:numFmt formatCode="General" sourceLinked="1"/>
+        <c:majorTickMark val="out"/>
+        <c:minorTickMark val="none"/>
         <c:tickLblPos val="nextTo"/>
         <c:spPr>
           <a:noFill/>
@@ -394,7 +440,7 @@
                 <a:cs typeface="+mn-cs"/>
               </a:defRPr>
             </a:pPr>
-            <a:endParaRPr lang="id-ID"/>
+            <a:endParaRPr lang="en-US"/>
           </a:p>
         </c:txPr>
         <c:crossAx val="76580736"/>
@@ -411,6 +457,7 @@
     </c:plotArea>
     <c:plotVisOnly val="1"/>
     <c:dispBlanksAs val="gap"/>
+    <c:showDLblsOverMax val="0"/>
   </c:chart>
   <c:spPr>
     <a:gradFill flip="none" rotWithShape="1">
@@ -445,10 +492,12 @@
       <a:pPr>
         <a:defRPr/>
       </a:pPr>
-      <a:endParaRPr lang="id-ID"/>
+      <a:endParaRPr lang="en-US"/>
     </a:p>
   </c:txPr>
-  <c:externalData r:id="rId1"/>
+  <c:externalData r:id="rId3">
+    <c:autoUpdate val="0"/>
+  </c:externalData>
 </c:chartSpace>
 </file>
 
@@ -1225,7 +1274,7 @@
             <a:fld id="{CE9077EA-1932-4119-9EFA-6369709D1BEA}" type="datetimeFigureOut">
               <a:rPr lang="en-US" smtClean="0"/>
               <a:pPr/>
-              <a:t>10/2/2018</a:t>
+              <a:t>10/9/2018</a:t>
             </a:fld>
             <a:endParaRPr lang="en-US"/>
           </a:p>
@@ -1277,7 +1326,7 @@
     </p:spTree>
     <p:extLst>
       <p:ext uri="{BB962C8B-B14F-4D97-AF65-F5344CB8AC3E}">
-        <p14:creationId xmlns:p14="http://schemas.microsoft.com/office/powerpoint/2010/main" xmlns="" val="3641946005"/>
+        <p14:creationId xmlns:p14="http://schemas.microsoft.com/office/powerpoint/2010/main" val="3641946005"/>
       </p:ext>
     </p:extLst>
   </p:cSld>
@@ -1397,7 +1446,7 @@
             <a:fld id="{CE9077EA-1932-4119-9EFA-6369709D1BEA}" type="datetimeFigureOut">
               <a:rPr lang="en-US" smtClean="0"/>
               <a:pPr/>
-              <a:t>10/2/2018</a:t>
+              <a:t>10/9/2018</a:t>
             </a:fld>
             <a:endParaRPr lang="en-US"/>
           </a:p>
@@ -1449,7 +1498,7 @@
     </p:spTree>
     <p:extLst>
       <p:ext uri="{BB962C8B-B14F-4D97-AF65-F5344CB8AC3E}">
-        <p14:creationId xmlns:p14="http://schemas.microsoft.com/office/powerpoint/2010/main" xmlns="" val="345474493"/>
+        <p14:creationId xmlns:p14="http://schemas.microsoft.com/office/powerpoint/2010/main" val="345474493"/>
       </p:ext>
     </p:extLst>
   </p:cSld>
@@ -1579,7 +1628,7 @@
             <a:fld id="{CE9077EA-1932-4119-9EFA-6369709D1BEA}" type="datetimeFigureOut">
               <a:rPr lang="en-US" smtClean="0"/>
               <a:pPr/>
-              <a:t>10/2/2018</a:t>
+              <a:t>10/9/2018</a:t>
             </a:fld>
             <a:endParaRPr lang="en-US"/>
           </a:p>
@@ -1631,7 +1680,7 @@
     </p:spTree>
     <p:extLst>
       <p:ext uri="{BB962C8B-B14F-4D97-AF65-F5344CB8AC3E}">
-        <p14:creationId xmlns:p14="http://schemas.microsoft.com/office/powerpoint/2010/main" xmlns="" val="1905052649"/>
+        <p14:creationId xmlns:p14="http://schemas.microsoft.com/office/powerpoint/2010/main" val="1905052649"/>
       </p:ext>
     </p:extLst>
   </p:cSld>
@@ -1751,7 +1800,7 @@
             <a:fld id="{CE9077EA-1932-4119-9EFA-6369709D1BEA}" type="datetimeFigureOut">
               <a:rPr lang="en-US" smtClean="0"/>
               <a:pPr/>
-              <a:t>10/2/2018</a:t>
+              <a:t>10/9/2018</a:t>
             </a:fld>
             <a:endParaRPr lang="en-US"/>
           </a:p>
@@ -1803,7 +1852,7 @@
     </p:spTree>
     <p:extLst>
       <p:ext uri="{BB962C8B-B14F-4D97-AF65-F5344CB8AC3E}">
-        <p14:creationId xmlns:p14="http://schemas.microsoft.com/office/powerpoint/2010/main" xmlns="" val="1354791756"/>
+        <p14:creationId xmlns:p14="http://schemas.microsoft.com/office/powerpoint/2010/main" val="1354791756"/>
       </p:ext>
     </p:extLst>
   </p:cSld>
@@ -1999,7 +2048,7 @@
             <a:fld id="{CE9077EA-1932-4119-9EFA-6369709D1BEA}" type="datetimeFigureOut">
               <a:rPr lang="en-US" smtClean="0"/>
               <a:pPr/>
-              <a:t>10/2/2018</a:t>
+              <a:t>10/9/2018</a:t>
             </a:fld>
             <a:endParaRPr lang="en-US"/>
           </a:p>
@@ -2051,7 +2100,7 @@
     </p:spTree>
     <p:extLst>
       <p:ext uri="{BB962C8B-B14F-4D97-AF65-F5344CB8AC3E}">
-        <p14:creationId xmlns:p14="http://schemas.microsoft.com/office/powerpoint/2010/main" xmlns="" val="721461642"/>
+        <p14:creationId xmlns:p14="http://schemas.microsoft.com/office/powerpoint/2010/main" val="721461642"/>
       </p:ext>
     </p:extLst>
   </p:cSld>
@@ -2233,7 +2282,7 @@
             <a:fld id="{CE9077EA-1932-4119-9EFA-6369709D1BEA}" type="datetimeFigureOut">
               <a:rPr lang="en-US" smtClean="0"/>
               <a:pPr/>
-              <a:t>10/2/2018</a:t>
+              <a:t>10/9/2018</a:t>
             </a:fld>
             <a:endParaRPr lang="en-US"/>
           </a:p>
@@ -2285,7 +2334,7 @@
     </p:spTree>
     <p:extLst>
       <p:ext uri="{BB962C8B-B14F-4D97-AF65-F5344CB8AC3E}">
-        <p14:creationId xmlns:p14="http://schemas.microsoft.com/office/powerpoint/2010/main" xmlns="" val="2546920739"/>
+        <p14:creationId xmlns:p14="http://schemas.microsoft.com/office/powerpoint/2010/main" val="2546920739"/>
       </p:ext>
     </p:extLst>
   </p:cSld>
@@ -2602,7 +2651,7 @@
             <a:fld id="{CE9077EA-1932-4119-9EFA-6369709D1BEA}" type="datetimeFigureOut">
               <a:rPr lang="en-US" smtClean="0"/>
               <a:pPr/>
-              <a:t>10/2/2018</a:t>
+              <a:t>10/9/2018</a:t>
             </a:fld>
             <a:endParaRPr lang="en-US"/>
           </a:p>
@@ -2654,7 +2703,7 @@
     </p:spTree>
     <p:extLst>
       <p:ext uri="{BB962C8B-B14F-4D97-AF65-F5344CB8AC3E}">
-        <p14:creationId xmlns:p14="http://schemas.microsoft.com/office/powerpoint/2010/main" xmlns="" val="3158428041"/>
+        <p14:creationId xmlns:p14="http://schemas.microsoft.com/office/powerpoint/2010/main" val="3158428041"/>
       </p:ext>
     </p:extLst>
   </p:cSld>
@@ -2722,7 +2771,7 @@
             <a:fld id="{CE9077EA-1932-4119-9EFA-6369709D1BEA}" type="datetimeFigureOut">
               <a:rPr lang="en-US" smtClean="0"/>
               <a:pPr/>
-              <a:t>10/2/2018</a:t>
+              <a:t>10/9/2018</a:t>
             </a:fld>
             <a:endParaRPr lang="en-US"/>
           </a:p>
@@ -2774,7 +2823,7 @@
     </p:spTree>
     <p:extLst>
       <p:ext uri="{BB962C8B-B14F-4D97-AF65-F5344CB8AC3E}">
-        <p14:creationId xmlns:p14="http://schemas.microsoft.com/office/powerpoint/2010/main" xmlns="" val="1384624449"/>
+        <p14:creationId xmlns:p14="http://schemas.microsoft.com/office/powerpoint/2010/main" val="1384624449"/>
       </p:ext>
     </p:extLst>
   </p:cSld>
@@ -2819,7 +2868,7 @@
             <a:fld id="{CE9077EA-1932-4119-9EFA-6369709D1BEA}" type="datetimeFigureOut">
               <a:rPr lang="en-US" smtClean="0"/>
               <a:pPr/>
-              <a:t>10/2/2018</a:t>
+              <a:t>10/9/2018</a:t>
             </a:fld>
             <a:endParaRPr lang="en-US"/>
           </a:p>
@@ -2871,7 +2920,7 @@
     </p:spTree>
     <p:extLst>
       <p:ext uri="{BB962C8B-B14F-4D97-AF65-F5344CB8AC3E}">
-        <p14:creationId xmlns:p14="http://schemas.microsoft.com/office/powerpoint/2010/main" xmlns="" val="4110464991"/>
+        <p14:creationId xmlns:p14="http://schemas.microsoft.com/office/powerpoint/2010/main" val="4110464991"/>
       </p:ext>
     </p:extLst>
   </p:cSld>
@@ -3098,7 +3147,7 @@
             <a:fld id="{CE9077EA-1932-4119-9EFA-6369709D1BEA}" type="datetimeFigureOut">
               <a:rPr lang="en-US" smtClean="0"/>
               <a:pPr/>
-              <a:t>10/2/2018</a:t>
+              <a:t>10/9/2018</a:t>
             </a:fld>
             <a:endParaRPr lang="en-US"/>
           </a:p>
@@ -3150,7 +3199,7 @@
     </p:spTree>
     <p:extLst>
       <p:ext uri="{BB962C8B-B14F-4D97-AF65-F5344CB8AC3E}">
-        <p14:creationId xmlns:p14="http://schemas.microsoft.com/office/powerpoint/2010/main" xmlns="" val="2389931355"/>
+        <p14:creationId xmlns:p14="http://schemas.microsoft.com/office/powerpoint/2010/main" val="2389931355"/>
       </p:ext>
     </p:extLst>
   </p:cSld>
@@ -3353,7 +3402,7 @@
             <a:fld id="{CE9077EA-1932-4119-9EFA-6369709D1BEA}" type="datetimeFigureOut">
               <a:rPr lang="en-US" smtClean="0"/>
               <a:pPr/>
-              <a:t>10/2/2018</a:t>
+              <a:t>10/9/2018</a:t>
             </a:fld>
             <a:endParaRPr lang="en-US"/>
           </a:p>
@@ -3405,7 +3454,7 @@
     </p:spTree>
     <p:extLst>
       <p:ext uri="{BB962C8B-B14F-4D97-AF65-F5344CB8AC3E}">
-        <p14:creationId xmlns:p14="http://schemas.microsoft.com/office/powerpoint/2010/main" xmlns="" val="2959715365"/>
+        <p14:creationId xmlns:p14="http://schemas.microsoft.com/office/powerpoint/2010/main" val="2959715365"/>
       </p:ext>
     </p:extLst>
   </p:cSld>
@@ -3568,7 +3617,7 @@
             <a:fld id="{CE9077EA-1932-4119-9EFA-6369709D1BEA}" type="datetimeFigureOut">
               <a:rPr lang="en-US" smtClean="0"/>
               <a:pPr/>
-              <a:t>10/2/2018</a:t>
+              <a:t>10/9/2018</a:t>
             </a:fld>
             <a:endParaRPr lang="en-US"/>
           </a:p>
@@ -3656,7 +3705,7 @@
     </p:spTree>
     <p:extLst>
       <p:ext uri="{BB962C8B-B14F-4D97-AF65-F5344CB8AC3E}">
-        <p14:creationId xmlns:p14="http://schemas.microsoft.com/office/powerpoint/2010/main" xmlns="" val="2933891876"/>
+        <p14:creationId xmlns:p14="http://schemas.microsoft.com/office/powerpoint/2010/main" val="2933891876"/>
       </p:ext>
     </p:extLst>
   </p:cSld>
@@ -3994,7 +4043,7 @@
           <a:blip r:embed="rId2">
             <a:extLst>
               <a:ext uri="{28A0092B-C50C-407E-A947-70E740481C1C}">
-                <a14:useLocalDpi xmlns:a14="http://schemas.microsoft.com/office/drawing/2010/main" xmlns="" val="0"/>
+                <a14:useLocalDpi xmlns:a14="http://schemas.microsoft.com/office/drawing/2010/main" val="0"/>
               </a:ext>
             </a:extLst>
           </a:blip>
@@ -4099,10 +4148,40 @@
           </a:p>
         </p:txBody>
       </p:sp>
+      <p:pic>
+        <p:nvPicPr>
+          <p:cNvPr id="6" name="Picture 5"/>
+          <p:cNvPicPr>
+            <a:picLocks noChangeAspect="1"/>
+          </p:cNvPicPr>
+          <p:nvPr/>
+        </p:nvPicPr>
+        <p:blipFill>
+          <a:blip r:embed="rId3" cstate="print">
+            <a:extLst>
+              <a:ext uri="{28A0092B-C50C-407E-A947-70E740481C1C}">
+                <a14:useLocalDpi xmlns:a14="http://schemas.microsoft.com/office/drawing/2010/main" val="0"/>
+              </a:ext>
+            </a:extLst>
+          </a:blip>
+          <a:stretch>
+            <a:fillRect/>
+          </a:stretch>
+        </p:blipFill>
+        <p:spPr>
+          <a:xfrm>
+            <a:off x="9308252" y="143204"/>
+            <a:ext cx="2719496" cy="495775"/>
+          </a:xfrm>
+          <a:prstGeom prst="rect">
+            <a:avLst/>
+          </a:prstGeom>
+        </p:spPr>
+      </p:pic>
     </p:spTree>
     <p:extLst>
       <p:ext uri="{BB962C8B-B14F-4D97-AF65-F5344CB8AC3E}">
-        <p14:creationId xmlns:p14="http://schemas.microsoft.com/office/powerpoint/2010/main" xmlns="" val="2586503709"/>
+        <p14:creationId xmlns:p14="http://schemas.microsoft.com/office/powerpoint/2010/main" val="2586503709"/>
       </p:ext>
     </p:extLst>
   </p:cSld>
@@ -4729,7 +4808,7 @@
           <a:blip r:embed="rId2">
             <a:extLst>
               <a:ext uri="{28A0092B-C50C-407E-A947-70E740481C1C}">
-                <a14:useLocalDpi xmlns:a14="http://schemas.microsoft.com/office/drawing/2010/main" xmlns="" val="0"/>
+                <a14:useLocalDpi xmlns:a14="http://schemas.microsoft.com/office/drawing/2010/main" val="0"/>
               </a:ext>
             </a:extLst>
           </a:blip>
@@ -5161,20 +5240,20 @@
     </p:spTree>
     <p:extLst>
       <p:ext uri="{BB962C8B-B14F-4D97-AF65-F5344CB8AC3E}">
-        <p14:creationId xmlns:p14="http://schemas.microsoft.com/office/powerpoint/2010/main" xmlns="" val="3851800605"/>
+        <p14:creationId xmlns:p14="http://schemas.microsoft.com/office/powerpoint/2010/main" val="3851800605"/>
       </p:ext>
     </p:extLst>
   </p:cSld>
   <p:clrMapOvr>
     <a:masterClrMapping/>
   </p:clrMapOvr>
-  <mc:AlternateContent xmlns:mc="http://schemas.openxmlformats.org/markup-compatibility/2006">
-    <mc:Choice xmlns:p15="http://schemas.microsoft.com/office/powerpoint/2012/main" xmlns="" Requires="p15">
+  <mc:AlternateContent xmlns:mc="http://schemas.openxmlformats.org/markup-compatibility/2006" xmlns:p15="http://schemas.microsoft.com/office/powerpoint/2012/main">
+    <mc:Choice Requires="p15">
       <p:transition xmlns:p14="http://schemas.microsoft.com/office/powerpoint/2010/main" spd="slow" p14:dur="1250">
         <p15:prstTrans prst="airplane"/>
       </p:transition>
     </mc:Choice>
-    <mc:Fallback>
+    <mc:Fallback xmlns="">
       <p:transition spd="slow">
         <p:fade/>
       </p:transition>
@@ -6150,7 +6229,7 @@
           <a:blip r:embed="rId2">
             <a:extLst>
               <a:ext uri="{BEBA8EAE-BF5A-486C-A8C5-ECC9F3942E4B}">
-                <a14:imgProps xmlns:a14="http://schemas.microsoft.com/office/drawing/2010/main" xmlns="">
+                <a14:imgProps xmlns:a14="http://schemas.microsoft.com/office/drawing/2010/main">
                   <a14:imgLayer r:embed="rId3">
                     <a14:imgEffect>
                       <a14:sharpenSoften amount="-2000"/>
@@ -6165,7 +6244,7 @@
                 </a14:imgProps>
               </a:ext>
               <a:ext uri="{28A0092B-C50C-407E-A947-70E740481C1C}">
-                <a14:useLocalDpi xmlns:a14="http://schemas.microsoft.com/office/drawing/2010/main" xmlns="" val="0"/>
+                <a14:useLocalDpi xmlns:a14="http://schemas.microsoft.com/office/drawing/2010/main" val="0"/>
               </a:ext>
             </a:extLst>
           </a:blip>
@@ -6414,7 +6493,7 @@
           <a:blip r:embed="rId4" cstate="print">
             <a:extLst>
               <a:ext uri="{28A0092B-C50C-407E-A947-70E740481C1C}">
-                <a14:useLocalDpi xmlns:a14="http://schemas.microsoft.com/office/drawing/2010/main" xmlns="" val="0"/>
+                <a14:useLocalDpi xmlns:a14="http://schemas.microsoft.com/office/drawing/2010/main" val="0"/>
               </a:ext>
             </a:extLst>
           </a:blip>
@@ -6444,7 +6523,7 @@
           <a:blip r:embed="rId5">
             <a:extLst>
               <a:ext uri="{28A0092B-C50C-407E-A947-70E740481C1C}">
-                <a14:useLocalDpi xmlns:a14="http://schemas.microsoft.com/office/drawing/2010/main" xmlns="" val="0"/>
+                <a14:useLocalDpi xmlns:a14="http://schemas.microsoft.com/office/drawing/2010/main" val="0"/>
               </a:ext>
             </a:extLst>
           </a:blip>
@@ -6474,7 +6553,7 @@
           <a:blip r:embed="rId6" cstate="print">
             <a:extLst>
               <a:ext uri="{28A0092B-C50C-407E-A947-70E740481C1C}">
-                <a14:useLocalDpi xmlns:a14="http://schemas.microsoft.com/office/drawing/2010/main" xmlns="" val="0"/>
+                <a14:useLocalDpi xmlns:a14="http://schemas.microsoft.com/office/drawing/2010/main" val="0"/>
               </a:ext>
             </a:extLst>
           </a:blip>
@@ -6504,7 +6583,7 @@
           <a:blip r:embed="rId7" cstate="print">
             <a:extLst>
               <a:ext uri="{28A0092B-C50C-407E-A947-70E740481C1C}">
-                <a14:useLocalDpi xmlns:a14="http://schemas.microsoft.com/office/drawing/2010/main" xmlns="" val="0"/>
+                <a14:useLocalDpi xmlns:a14="http://schemas.microsoft.com/office/drawing/2010/main" val="0"/>
               </a:ext>
             </a:extLst>
           </a:blip>
@@ -6534,7 +6613,7 @@
           <a:blip r:embed="rId8" cstate="print">
             <a:extLst>
               <a:ext uri="{28A0092B-C50C-407E-A947-70E740481C1C}">
-                <a14:useLocalDpi xmlns:a14="http://schemas.microsoft.com/office/drawing/2010/main" xmlns="" val="0"/>
+                <a14:useLocalDpi xmlns:a14="http://schemas.microsoft.com/office/drawing/2010/main" val="0"/>
               </a:ext>
             </a:extLst>
           </a:blip>
@@ -6564,7 +6643,7 @@
           <a:blip r:embed="rId9" cstate="print">
             <a:extLst>
               <a:ext uri="{28A0092B-C50C-407E-A947-70E740481C1C}">
-                <a14:useLocalDpi xmlns:a14="http://schemas.microsoft.com/office/drawing/2010/main" xmlns="" val="0"/>
+                <a14:useLocalDpi xmlns:a14="http://schemas.microsoft.com/office/drawing/2010/main" val="0"/>
               </a:ext>
             </a:extLst>
           </a:blip>
@@ -6594,7 +6673,7 @@
           <a:blip r:embed="rId10" cstate="print">
             <a:extLst>
               <a:ext uri="{28A0092B-C50C-407E-A947-70E740481C1C}">
-                <a14:useLocalDpi xmlns:a14="http://schemas.microsoft.com/office/drawing/2010/main" xmlns="" val="0"/>
+                <a14:useLocalDpi xmlns:a14="http://schemas.microsoft.com/office/drawing/2010/main" val="0"/>
               </a:ext>
             </a:extLst>
           </a:blip>
@@ -6649,20 +6728,20 @@
     </p:spTree>
     <p:extLst>
       <p:ext uri="{BB962C8B-B14F-4D97-AF65-F5344CB8AC3E}">
-        <p14:creationId xmlns:p14="http://schemas.microsoft.com/office/powerpoint/2010/main" xmlns="" val="56084591"/>
+        <p14:creationId xmlns:p14="http://schemas.microsoft.com/office/powerpoint/2010/main" val="56084591"/>
       </p:ext>
     </p:extLst>
   </p:cSld>
   <p:clrMapOvr>
     <a:masterClrMapping/>
   </p:clrMapOvr>
-  <mc:AlternateContent xmlns:mc="http://schemas.openxmlformats.org/markup-compatibility/2006">
-    <mc:Choice xmlns:p15="http://schemas.microsoft.com/office/powerpoint/2012/main" xmlns="" Requires="p15">
+  <mc:AlternateContent xmlns:mc="http://schemas.openxmlformats.org/markup-compatibility/2006" xmlns:p15="http://schemas.microsoft.com/office/powerpoint/2012/main">
+    <mc:Choice Requires="p15">
       <p:transition xmlns:p14="http://schemas.microsoft.com/office/powerpoint/2010/main" spd="slow" p14:dur="1250">
         <p15:prstTrans prst="airplane"/>
       </p:transition>
     </mc:Choice>
-    <mc:Fallback>
+    <mc:Fallback xmlns="">
       <p:transition spd="slow">
         <p:fade/>
       </p:transition>
@@ -7988,7 +8067,7 @@
           <a:blip r:embed="rId2" cstate="print">
             <a:extLst>
               <a:ext uri="{28A0092B-C50C-407E-A947-70E740481C1C}">
-                <a14:useLocalDpi xmlns:a14="http://schemas.microsoft.com/office/drawing/2010/main" xmlns="" val="0"/>
+                <a14:useLocalDpi xmlns:a14="http://schemas.microsoft.com/office/drawing/2010/main" val="0"/>
               </a:ext>
             </a:extLst>
           </a:blip>
@@ -8125,7 +8204,7 @@
           <a:blip r:embed="rId3" cstate="print">
             <a:extLst>
               <a:ext uri="{28A0092B-C50C-407E-A947-70E740481C1C}">
-                <a14:useLocalDpi xmlns:a14="http://schemas.microsoft.com/office/drawing/2010/main" xmlns="" val="0"/>
+                <a14:useLocalDpi xmlns:a14="http://schemas.microsoft.com/office/drawing/2010/main" val="0"/>
               </a:ext>
             </a:extLst>
           </a:blip>
@@ -8196,7 +8275,7 @@
           <a:blip r:embed="rId4">
             <a:extLst>
               <a:ext uri="{28A0092B-C50C-407E-A947-70E740481C1C}">
-                <a14:useLocalDpi xmlns:a14="http://schemas.microsoft.com/office/drawing/2010/main" xmlns="" val="0"/>
+                <a14:useLocalDpi xmlns:a14="http://schemas.microsoft.com/office/drawing/2010/main" val="0"/>
               </a:ext>
             </a:extLst>
           </a:blip>
@@ -8244,16 +8323,7 @@
                 </a:solidFill>
                 <a:latin typeface="Gotham Rounded Book" pitchFamily="50" charset="0"/>
               </a:rPr>
-              <a:t>Semester </a:t>
-            </a:r>
-            <a:r>
-              <a:rPr lang="en-US" dirty="0" smtClean="0">
-                <a:solidFill>
-                  <a:schemeClr val="bg1"/>
-                </a:solidFill>
-                <a:latin typeface="Gotham Rounded Book" pitchFamily="50" charset="0"/>
-              </a:rPr>
-              <a:t>V</a:t>
+              <a:t>Semester V</a:t>
             </a:r>
             <a:endParaRPr lang="en-US" dirty="0">
               <a:solidFill>
@@ -8276,7 +8346,7 @@
           <a:blip r:embed="rId5" cstate="print">
             <a:extLst>
               <a:ext uri="{28A0092B-C50C-407E-A947-70E740481C1C}">
-                <a14:useLocalDpi xmlns:a14="http://schemas.microsoft.com/office/drawing/2010/main" xmlns="" val="0"/>
+                <a14:useLocalDpi xmlns:a14="http://schemas.microsoft.com/office/drawing/2010/main" val="0"/>
               </a:ext>
             </a:extLst>
           </a:blip>
@@ -8356,7 +8426,7 @@
           <a:blip r:embed="rId6" cstate="print">
             <a:extLst>
               <a:ext uri="{28A0092B-C50C-407E-A947-70E740481C1C}">
-                <a14:useLocalDpi xmlns:a14="http://schemas.microsoft.com/office/drawing/2010/main" xmlns="" val="0"/>
+                <a14:useLocalDpi xmlns:a14="http://schemas.microsoft.com/office/drawing/2010/main" val="0"/>
               </a:ext>
             </a:extLst>
           </a:blip>
@@ -8386,7 +8456,7 @@
           <a:blip r:embed="rId7" cstate="print">
             <a:extLst>
               <a:ext uri="{28A0092B-C50C-407E-A947-70E740481C1C}">
-                <a14:useLocalDpi xmlns:a14="http://schemas.microsoft.com/office/drawing/2010/main" xmlns="" val="0"/>
+                <a14:useLocalDpi xmlns:a14="http://schemas.microsoft.com/office/drawing/2010/main" val="0"/>
               </a:ext>
             </a:extLst>
           </a:blip>
@@ -8776,20 +8846,20 @@
     </p:spTree>
     <p:extLst>
       <p:ext uri="{BB962C8B-B14F-4D97-AF65-F5344CB8AC3E}">
-        <p14:creationId xmlns:p14="http://schemas.microsoft.com/office/powerpoint/2010/main" xmlns="" val="1080347325"/>
+        <p14:creationId xmlns:p14="http://schemas.microsoft.com/office/powerpoint/2010/main" val="1080347325"/>
       </p:ext>
     </p:extLst>
   </p:cSld>
   <p:clrMapOvr>
     <a:masterClrMapping/>
   </p:clrMapOvr>
-  <mc:AlternateContent xmlns:mc="http://schemas.openxmlformats.org/markup-compatibility/2006">
-    <mc:Choice xmlns:p15="http://schemas.microsoft.com/office/powerpoint/2012/main" xmlns="" Requires="p15">
+  <mc:AlternateContent xmlns:mc="http://schemas.openxmlformats.org/markup-compatibility/2006" xmlns:p15="http://schemas.microsoft.com/office/powerpoint/2012/main">
+    <mc:Choice Requires="p15">
       <p:transition xmlns:p14="http://schemas.microsoft.com/office/powerpoint/2010/main" spd="slow" p14:dur="1250">
         <p15:prstTrans prst="airplane"/>
       </p:transition>
     </mc:Choice>
-    <mc:Fallback>
+    <mc:Fallback xmlns="">
       <p:transition spd="slow">
         <p:fade/>
       </p:transition>
@@ -10486,7 +10556,7 @@
           <p:nvPr>
             <p:extLst>
               <p:ext uri="{D42A27DB-BD31-4B8C-83A1-F6EECF244321}">
-                <p14:modId xmlns:p14="http://schemas.microsoft.com/office/powerpoint/2010/main" xmlns="" val="812009269"/>
+                <p14:modId xmlns:p14="http://schemas.microsoft.com/office/powerpoint/2010/main" val="812009269"/>
               </p:ext>
             </p:extLst>
           </p:nvPr>
@@ -10504,20 +10574,20 @@
     </p:spTree>
     <p:extLst>
       <p:ext uri="{BB962C8B-B14F-4D97-AF65-F5344CB8AC3E}">
-        <p14:creationId xmlns:p14="http://schemas.microsoft.com/office/powerpoint/2010/main" xmlns="" val="3412000255"/>
+        <p14:creationId xmlns:p14="http://schemas.microsoft.com/office/powerpoint/2010/main" val="3412000255"/>
       </p:ext>
     </p:extLst>
   </p:cSld>
   <p:clrMapOvr>
     <a:masterClrMapping/>
   </p:clrMapOvr>
-  <mc:AlternateContent xmlns:mc="http://schemas.openxmlformats.org/markup-compatibility/2006">
-    <mc:Choice xmlns:p15="http://schemas.microsoft.com/office/powerpoint/2012/main" xmlns="" Requires="p15">
+  <mc:AlternateContent xmlns:mc="http://schemas.openxmlformats.org/markup-compatibility/2006" xmlns:p15="http://schemas.microsoft.com/office/powerpoint/2012/main">
+    <mc:Choice Requires="p15">
       <p:transition xmlns:p14="http://schemas.microsoft.com/office/powerpoint/2010/main" spd="slow" p14:dur="1250">
         <p15:prstTrans prst="airplane"/>
       </p:transition>
     </mc:Choice>
-    <mc:Fallback>
+    <mc:Fallback xmlns="">
       <p:transition spd="slow">
         <p:fade/>
       </p:transition>
@@ -10789,7 +10859,7 @@
           <a:blip r:embed="rId2">
             <a:extLst>
               <a:ext uri="{28A0092B-C50C-407E-A947-70E740481C1C}">
-                <a14:useLocalDpi xmlns:a14="http://schemas.microsoft.com/office/drawing/2010/main" xmlns="" val="0"/>
+                <a14:useLocalDpi xmlns:a14="http://schemas.microsoft.com/office/drawing/2010/main" val="0"/>
               </a:ext>
             </a:extLst>
           </a:blip>
@@ -10864,20 +10934,20 @@
     </p:spTree>
     <p:extLst>
       <p:ext uri="{BB962C8B-B14F-4D97-AF65-F5344CB8AC3E}">
-        <p14:creationId xmlns:p14="http://schemas.microsoft.com/office/powerpoint/2010/main" xmlns="" val="1125100163"/>
+        <p14:creationId xmlns:p14="http://schemas.microsoft.com/office/powerpoint/2010/main" val="1125100163"/>
       </p:ext>
     </p:extLst>
   </p:cSld>
   <p:clrMapOvr>
     <a:masterClrMapping/>
   </p:clrMapOvr>
-  <mc:AlternateContent xmlns:mc="http://schemas.openxmlformats.org/markup-compatibility/2006">
-    <mc:Choice xmlns:p15="http://schemas.microsoft.com/office/powerpoint/2012/main" xmlns="" Requires="p15">
+  <mc:AlternateContent xmlns:mc="http://schemas.openxmlformats.org/markup-compatibility/2006" xmlns:p15="http://schemas.microsoft.com/office/powerpoint/2012/main">
+    <mc:Choice Requires="p15">
       <p:transition xmlns:p14="http://schemas.microsoft.com/office/powerpoint/2010/main" spd="slow" p14:dur="1250">
         <p15:prstTrans prst="airplane"/>
       </p:transition>
     </mc:Choice>
-    <mc:Fallback>
+    <mc:Fallback xmlns="">
       <p:transition spd="slow">
         <p:fade/>
       </p:transition>
@@ -11096,7 +11166,7 @@
           <a:blip r:embed="rId2">
             <a:extLst>
               <a:ext uri="{28A0092B-C50C-407E-A947-70E740481C1C}">
-                <a14:useLocalDpi xmlns:a14="http://schemas.microsoft.com/office/drawing/2010/main" xmlns="" val="0"/>
+                <a14:useLocalDpi xmlns:a14="http://schemas.microsoft.com/office/drawing/2010/main" val="0"/>
               </a:ext>
             </a:extLst>
           </a:blip>
@@ -11116,20 +11186,20 @@
     </p:spTree>
     <p:extLst>
       <p:ext uri="{BB962C8B-B14F-4D97-AF65-F5344CB8AC3E}">
-        <p14:creationId xmlns:p14="http://schemas.microsoft.com/office/powerpoint/2010/main" xmlns="" val="2960280949"/>
+        <p14:creationId xmlns:p14="http://schemas.microsoft.com/office/powerpoint/2010/main" val="2960280949"/>
       </p:ext>
     </p:extLst>
   </p:cSld>
   <p:clrMapOvr>
     <a:masterClrMapping/>
   </p:clrMapOvr>
-  <mc:AlternateContent xmlns:mc="http://schemas.openxmlformats.org/markup-compatibility/2006">
-    <mc:Choice xmlns:p15="http://schemas.microsoft.com/office/powerpoint/2012/main" xmlns="" Requires="p15">
+  <mc:AlternateContent xmlns:mc="http://schemas.openxmlformats.org/markup-compatibility/2006" xmlns:p15="http://schemas.microsoft.com/office/powerpoint/2012/main">
+    <mc:Choice Requires="p15">
       <p:transition xmlns:p14="http://schemas.microsoft.com/office/powerpoint/2010/main" spd="slow" p14:dur="1250">
         <p15:prstTrans prst="airplane"/>
       </p:transition>
     </mc:Choice>
-    <mc:Fallback>
+    <mc:Fallback xmlns="">
       <p:transition spd="slow">
         <p:fade/>
       </p:transition>
@@ -11488,7 +11558,7 @@
           <a:blip r:embed="rId2" cstate="print">
             <a:extLst>
               <a:ext uri="{28A0092B-C50C-407E-A947-70E740481C1C}">
-                <a14:useLocalDpi xmlns:a14="http://schemas.microsoft.com/office/drawing/2010/main" xmlns="" val="0"/>
+                <a14:useLocalDpi xmlns:a14="http://schemas.microsoft.com/office/drawing/2010/main" val="0"/>
               </a:ext>
             </a:extLst>
           </a:blip>
@@ -11518,7 +11588,7 @@
           <a:blip r:embed="rId3">
             <a:extLst>
               <a:ext uri="{28A0092B-C50C-407E-A947-70E740481C1C}">
-                <a14:useLocalDpi xmlns:a14="http://schemas.microsoft.com/office/drawing/2010/main" xmlns="" val="0"/>
+                <a14:useLocalDpi xmlns:a14="http://schemas.microsoft.com/office/drawing/2010/main" val="0"/>
               </a:ext>
             </a:extLst>
           </a:blip>
@@ -11548,7 +11618,7 @@
           <a:blip r:embed="rId4">
             <a:extLst>
               <a:ext uri="{28A0092B-C50C-407E-A947-70E740481C1C}">
-                <a14:useLocalDpi xmlns:a14="http://schemas.microsoft.com/office/drawing/2010/main" xmlns="" val="0"/>
+                <a14:useLocalDpi xmlns:a14="http://schemas.microsoft.com/office/drawing/2010/main" val="0"/>
               </a:ext>
             </a:extLst>
           </a:blip>
@@ -11578,7 +11648,7 @@
           <a:blip r:embed="rId5">
             <a:extLst>
               <a:ext uri="{28A0092B-C50C-407E-A947-70E740481C1C}">
-                <a14:useLocalDpi xmlns:a14="http://schemas.microsoft.com/office/drawing/2010/main" xmlns="" val="0"/>
+                <a14:useLocalDpi xmlns:a14="http://schemas.microsoft.com/office/drawing/2010/main" val="0"/>
               </a:ext>
             </a:extLst>
           </a:blip>
@@ -11599,20 +11669,20 @@
     </p:spTree>
     <p:extLst>
       <p:ext uri="{BB962C8B-B14F-4D97-AF65-F5344CB8AC3E}">
-        <p14:creationId xmlns:p14="http://schemas.microsoft.com/office/powerpoint/2010/main" xmlns="" val="648615334"/>
+        <p14:creationId xmlns:p14="http://schemas.microsoft.com/office/powerpoint/2010/main" val="648615334"/>
       </p:ext>
     </p:extLst>
   </p:cSld>
   <p:clrMapOvr>
     <a:masterClrMapping/>
   </p:clrMapOvr>
-  <mc:AlternateContent xmlns:mc="http://schemas.openxmlformats.org/markup-compatibility/2006">
-    <mc:Choice xmlns:p15="http://schemas.microsoft.com/office/powerpoint/2012/main" xmlns="" Requires="p15">
+  <mc:AlternateContent xmlns:mc="http://schemas.openxmlformats.org/markup-compatibility/2006" xmlns:p15="http://schemas.microsoft.com/office/powerpoint/2012/main">
+    <mc:Choice Requires="p15">
       <p:transition xmlns:p14="http://schemas.microsoft.com/office/powerpoint/2010/main" spd="slow" p14:dur="1250">
         <p15:prstTrans prst="airplane"/>
       </p:transition>
     </mc:Choice>
-    <mc:Fallback>
+    <mc:Fallback xmlns="">
       <p:transition spd="slow">
         <p:fade/>
       </p:transition>
@@ -12395,7 +12465,7 @@
           <a:blip r:embed="rId2">
             <a:extLst>
               <a:ext uri="{28A0092B-C50C-407E-A947-70E740481C1C}">
-                <a14:useLocalDpi xmlns:a14="http://schemas.microsoft.com/office/drawing/2010/main" xmlns="" val="0"/>
+                <a14:useLocalDpi xmlns:a14="http://schemas.microsoft.com/office/drawing/2010/main" val="0"/>
               </a:ext>
             </a:extLst>
           </a:blip>
@@ -12416,20 +12486,20 @@
     </p:spTree>
     <p:extLst>
       <p:ext uri="{BB962C8B-B14F-4D97-AF65-F5344CB8AC3E}">
-        <p14:creationId xmlns:p14="http://schemas.microsoft.com/office/powerpoint/2010/main" xmlns="" val="4150965049"/>
+        <p14:creationId xmlns:p14="http://schemas.microsoft.com/office/powerpoint/2010/main" val="4150965049"/>
       </p:ext>
     </p:extLst>
   </p:cSld>
   <p:clrMapOvr>
     <a:masterClrMapping/>
   </p:clrMapOvr>
-  <mc:AlternateContent xmlns:mc="http://schemas.openxmlformats.org/markup-compatibility/2006">
-    <mc:Choice xmlns:p15="http://schemas.microsoft.com/office/powerpoint/2012/main" xmlns="" Requires="p15">
+  <mc:AlternateContent xmlns:mc="http://schemas.openxmlformats.org/markup-compatibility/2006" xmlns:p15="http://schemas.microsoft.com/office/powerpoint/2012/main">
+    <mc:Choice Requires="p15">
       <p:transition xmlns:p14="http://schemas.microsoft.com/office/powerpoint/2010/main" spd="slow" p14:dur="1250">
         <p15:prstTrans prst="airplane"/>
       </p:transition>
     </mc:Choice>
-    <mc:Fallback>
+    <mc:Fallback xmlns="">
       <p:transition spd="slow">
         <p:fade/>
       </p:transition>
@@ -12706,7 +12776,7 @@
           <a:blip r:embed="rId2">
             <a:extLst>
               <a:ext uri="{28A0092B-C50C-407E-A947-70E740481C1C}">
-                <a14:useLocalDpi xmlns:a14="http://schemas.microsoft.com/office/drawing/2010/main" xmlns="" val="0"/>
+                <a14:useLocalDpi xmlns:a14="http://schemas.microsoft.com/office/drawing/2010/main" val="0"/>
               </a:ext>
             </a:extLst>
           </a:blip>
@@ -12887,20 +12957,20 @@
     </p:spTree>
     <p:extLst>
       <p:ext uri="{BB962C8B-B14F-4D97-AF65-F5344CB8AC3E}">
-        <p14:creationId xmlns:p14="http://schemas.microsoft.com/office/powerpoint/2010/main" xmlns="" val="620933495"/>
+        <p14:creationId xmlns:p14="http://schemas.microsoft.com/office/powerpoint/2010/main" val="620933495"/>
       </p:ext>
     </p:extLst>
   </p:cSld>
   <p:clrMapOvr>
     <a:masterClrMapping/>
   </p:clrMapOvr>
-  <mc:AlternateContent xmlns:mc="http://schemas.openxmlformats.org/markup-compatibility/2006">
-    <mc:Choice xmlns:p15="http://schemas.microsoft.com/office/powerpoint/2012/main" xmlns="" Requires="p15">
+  <mc:AlternateContent xmlns:mc="http://schemas.openxmlformats.org/markup-compatibility/2006" xmlns:p15="http://schemas.microsoft.com/office/powerpoint/2012/main">
+    <mc:Choice Requires="p15">
       <p:transition xmlns:p14="http://schemas.microsoft.com/office/powerpoint/2010/main" spd="slow" p14:dur="1250">
         <p15:prstTrans prst="airplane"/>
       </p:transition>
     </mc:Choice>
-    <mc:Fallback>
+    <mc:Fallback xmlns="">
       <p:transition spd="slow">
         <p:fade/>
       </p:transition>
@@ -13177,7 +13247,7 @@
           <a:blip r:embed="rId2">
             <a:extLst>
               <a:ext uri="{28A0092B-C50C-407E-A947-70E740481C1C}">
-                <a14:useLocalDpi xmlns:a14="http://schemas.microsoft.com/office/drawing/2010/main" xmlns="" val="0"/>
+                <a14:useLocalDpi xmlns:a14="http://schemas.microsoft.com/office/drawing/2010/main" val="0"/>
               </a:ext>
             </a:extLst>
           </a:blip>
@@ -13574,20 +13644,20 @@
     </p:spTree>
     <p:extLst>
       <p:ext uri="{BB962C8B-B14F-4D97-AF65-F5344CB8AC3E}">
-        <p14:creationId xmlns:p14="http://schemas.microsoft.com/office/powerpoint/2010/main" xmlns="" val="936538635"/>
+        <p14:creationId xmlns:p14="http://schemas.microsoft.com/office/powerpoint/2010/main" val="936538635"/>
       </p:ext>
     </p:extLst>
   </p:cSld>
   <p:clrMapOvr>
     <a:masterClrMapping/>
   </p:clrMapOvr>
-  <mc:AlternateContent xmlns:mc="http://schemas.openxmlformats.org/markup-compatibility/2006">
-    <mc:Choice xmlns:p15="http://schemas.microsoft.com/office/powerpoint/2012/main" xmlns="" Requires="p15">
+  <mc:AlternateContent xmlns:mc="http://schemas.openxmlformats.org/markup-compatibility/2006" xmlns:p15="http://schemas.microsoft.com/office/powerpoint/2012/main">
+    <mc:Choice Requires="p15">
       <p:transition xmlns:p14="http://schemas.microsoft.com/office/powerpoint/2010/main" spd="slow" p14:dur="1250">
         <p15:prstTrans prst="airplane"/>
       </p:transition>
     </mc:Choice>
-    <mc:Fallback>
+    <mc:Fallback xmlns="">
       <p:transition spd="slow">
         <p:fade/>
       </p:transition>
@@ -14082,7 +14152,7 @@
   <a:extraClrSchemeLst/>
   <a:extLst>
     <a:ext uri="{05A4C25C-085E-4340-85A3-A5531E510DB2}">
-      <thm15:themeFamily xmlns:thm15="http://schemas.microsoft.com/office/thememl/2012/main" xmlns="" name="Office Theme" id="{62F939B6-93AF-4DB8-9C6B-D6C7DFDC589F}" vid="{4A3C46E8-61CC-4603-A589-7422A47A8E4A}"/>
+      <thm15:themeFamily xmlns:thm15="http://schemas.microsoft.com/office/thememl/2012/main" name="Office Theme" id="{62F939B6-93AF-4DB8-9C6B-D6C7DFDC589F}" vid="{4A3C46E8-61CC-4603-A589-7422A47A8E4A}"/>
     </a:ext>
   </a:extLst>
 </a:theme>

</xml_diff>